<commit_message>
SC-279: parse Slide background fill
</commit_message>
<xml_diff>
--- a/ShapeCrawler.Tests/Resource/009_table.pptx
+++ b/ShapeCrawler.Tests/Resource/009_table.pptx
@@ -156,7 +156,7 @@
               <a:cs typeface="+mn-cs"/>
             </a:defRPr>
           </a:pPr>
-          <a:endParaRPr lang="en-US"/>
+          <a:endParaRPr lang="de-DE"/>
         </a:p>
       </c:txPr>
     </c:title>
@@ -434,7 +434,7 @@
                 <a:cs typeface="+mn-cs"/>
               </a:defRPr>
             </a:pPr>
-            <a:endParaRPr lang="en-US"/>
+            <a:endParaRPr lang="de-DE"/>
           </a:p>
         </c:txPr>
         <c:crossAx val="947864576"/>
@@ -493,7 +493,7 @@
                 <a:cs typeface="+mn-cs"/>
               </a:defRPr>
             </a:pPr>
-            <a:endParaRPr lang="en-US"/>
+            <a:endParaRPr lang="de-DE"/>
           </a:p>
         </c:txPr>
         <c:crossAx val="947800784"/>
@@ -535,7 +535,7 @@
               <a:cs typeface="+mn-cs"/>
             </a:defRPr>
           </a:pPr>
-          <a:endParaRPr lang="en-US"/>
+          <a:endParaRPr lang="de-DE"/>
         </a:p>
       </c:txPr>
     </c:legend>
@@ -564,7 +564,7 @@
       <a:pPr>
         <a:defRPr/>
       </a:pPr>
-      <a:endParaRPr lang="en-US"/>
+      <a:endParaRPr lang="de-DE"/>
     </a:p>
   </c:txPr>
   <c:externalData r:id="rId3">
@@ -613,7 +613,7 @@
               <a:cs typeface="+mn-cs"/>
             </a:defRPr>
           </a:pPr>
-          <a:endParaRPr lang="en-US"/>
+          <a:endParaRPr lang="de-DE"/>
         </a:p>
       </c:txPr>
     </c:title>
@@ -809,7 +809,7 @@
               <a:cs typeface="+mn-cs"/>
             </a:defRPr>
           </a:pPr>
-          <a:endParaRPr lang="en-US"/>
+          <a:endParaRPr lang="de-DE"/>
         </a:p>
       </c:txPr>
     </c:legend>
@@ -838,7 +838,7 @@
       <a:pPr>
         <a:defRPr/>
       </a:pPr>
-      <a:endParaRPr lang="en-US"/>
+      <a:endParaRPr lang="de-DE"/>
     </a:p>
   </c:txPr>
   <c:externalData r:id="rId3">
@@ -899,7 +899,7 @@
               <a:cs typeface="+mn-cs"/>
             </a:defRPr>
           </a:pPr>
-          <a:endParaRPr lang="en-US"/>
+          <a:endParaRPr lang="de-DE"/>
         </a:p>
       </c:txPr>
     </c:title>
@@ -1110,7 +1110,7 @@
               <a:cs typeface="+mn-cs"/>
             </a:defRPr>
           </a:pPr>
-          <a:endParaRPr lang="en-US"/>
+          <a:endParaRPr lang="de-DE"/>
         </a:p>
       </c:txPr>
     </c:legend>
@@ -1139,7 +1139,7 @@
       <a:pPr>
         <a:defRPr/>
       </a:pPr>
-      <a:endParaRPr lang="en-US"/>
+      <a:endParaRPr lang="de-DE"/>
     </a:p>
   </c:txPr>
   <c:externalData r:id="rId4">
@@ -1214,7 +1214,7 @@
               <a:cs typeface="+mn-cs"/>
             </a:defRPr>
           </a:pPr>
-          <a:endParaRPr lang="en-US"/>
+          <a:endParaRPr lang="de-DE"/>
         </a:p>
       </c:txPr>
     </c:title>
@@ -1410,7 +1410,7 @@
               <a:cs typeface="+mn-cs"/>
             </a:defRPr>
           </a:pPr>
-          <a:endParaRPr lang="en-US"/>
+          <a:endParaRPr lang="de-DE"/>
         </a:p>
       </c:txPr>
     </c:legend>
@@ -1441,7 +1441,7 @@
       <a:pPr>
         <a:defRPr/>
       </a:pPr>
-      <a:endParaRPr lang="en-US"/>
+      <a:endParaRPr lang="de-DE"/>
     </a:p>
   </c:txPr>
   <c:externalData r:id="rId3">
@@ -1490,7 +1490,7 @@
               <a:cs typeface="+mn-cs"/>
             </a:defRPr>
           </a:pPr>
-          <a:endParaRPr lang="en-US"/>
+          <a:endParaRPr lang="de-DE"/>
         </a:p>
       </c:txPr>
     </c:title>
@@ -1712,7 +1712,7 @@
               <a:cs typeface="+mn-cs"/>
             </a:defRPr>
           </a:pPr>
-          <a:endParaRPr lang="en-US"/>
+          <a:endParaRPr lang="de-DE"/>
         </a:p>
       </c:txPr>
     </c:legend>
@@ -1743,7 +1743,7 @@
       <a:pPr>
         <a:defRPr/>
       </a:pPr>
-      <a:endParaRPr lang="en-US"/>
+      <a:endParaRPr lang="de-DE"/>
     </a:p>
   </c:txPr>
   <c:externalData r:id="rId3">
@@ -1818,7 +1818,7 @@
               <a:cs typeface="+mn-cs"/>
             </a:defRPr>
           </a:pPr>
-          <a:endParaRPr lang="en-US"/>
+          <a:endParaRPr lang="de-DE"/>
         </a:p>
       </c:txPr>
     </c:title>
@@ -2145,7 +2145,7 @@
       <a:pPr>
         <a:defRPr/>
       </a:pPr>
-      <a:endParaRPr lang="en-US"/>
+      <a:endParaRPr lang="de-DE"/>
     </a:p>
   </c:txPr>
   <c:externalData r:id="rId3">
@@ -8246,7 +8246,7 @@
           <a:graphicData uri="http://schemas.openxmlformats.org/presentationml/2006/ole">
             <mc:AlternateContent xmlns:mc="http://schemas.openxmlformats.org/markup-compatibility/2006">
               <mc:Choice xmlns:v="urn:schemas-microsoft-com:vml" Requires="v">
-                <p:oleObj spid="_x0000_s1026" name="Document" r:id="rId4" imgW="5940848" imgH="323743" progId="Word.Document.12">
+                <p:oleObj spid="_x0000_s1032" name="Document" r:id="rId4" imgW="5940848" imgH="323743" progId="Word.Document.12">
                   <p:embed/>
                 </p:oleObj>
               </mc:Choice>
@@ -8351,7 +8351,7 @@
           <a:graphicData uri="http://schemas.openxmlformats.org/presentationml/2006/ole">
             <mc:AlternateContent xmlns:mc="http://schemas.openxmlformats.org/markup-compatibility/2006">
               <mc:Choice xmlns:v="urn:schemas-microsoft-com:vml" Requires="v">
-                <p:oleObj spid="_x0000_s1027" name="Packager Shell Object" showAsIcon="1" r:id="rId6" imgW="485640" imgH="372960" progId="Package">
+                <p:oleObj spid="_x0000_s1033" name="Packager Shell Object" showAsIcon="1" r:id="rId6" imgW="485640" imgH="372960" progId="Package">
                   <p:embed/>
                 </p:oleObj>
               </mc:Choice>
@@ -8438,6 +8438,135 @@
           <a:p>
             <a:pPr algn="ctr"/>
             <a:endParaRPr lang="ru-UA" dirty="0"/>
+          </a:p>
+        </p:txBody>
+      </p:sp>
+      <p:sp>
+        <p:nvSpPr>
+          <p:cNvPr id="10" name="AutoShape 1">
+            <a:extLst>
+              <a:ext uri="{FF2B5EF4-FFF2-40B4-BE49-F238E27FC236}">
+                <a16:creationId xmlns:a16="http://schemas.microsoft.com/office/drawing/2014/main" id="{C283B678-8A6B-4320-8C0D-85EDD6FFBCAB}"/>
+              </a:ext>
+            </a:extLst>
+          </p:cNvPr>
+          <p:cNvSpPr/>
+          <p:nvPr/>
+        </p:nvSpPr>
+        <p:spPr>
+          <a:xfrm>
+            <a:off x="4793842" y="2871788"/>
+            <a:ext cx="1064419" cy="809367"/>
+          </a:xfrm>
+          <a:prstGeom prst="rect">
+            <a:avLst/>
+          </a:prstGeom>
+          <a:gradFill>
+            <a:gsLst>
+              <a:gs pos="0">
+                <a:schemeClr val="accent1">
+                  <a:lumMod val="5000"/>
+                  <a:lumOff val="95000"/>
+                </a:schemeClr>
+              </a:gs>
+              <a:gs pos="74000">
+                <a:schemeClr val="accent1">
+                  <a:lumMod val="45000"/>
+                  <a:lumOff val="55000"/>
+                </a:schemeClr>
+              </a:gs>
+              <a:gs pos="83000">
+                <a:schemeClr val="accent1">
+                  <a:lumMod val="45000"/>
+                  <a:lumOff val="55000"/>
+                </a:schemeClr>
+              </a:gs>
+              <a:gs pos="100000">
+                <a:schemeClr val="accent1">
+                  <a:lumMod val="30000"/>
+                  <a:lumOff val="70000"/>
+                </a:schemeClr>
+              </a:gs>
+            </a:gsLst>
+            <a:lin ang="5400000" scaled="1"/>
+          </a:gradFill>
+        </p:spPr>
+        <p:style>
+          <a:lnRef idx="2">
+            <a:schemeClr val="accent1">
+              <a:shade val="50000"/>
+            </a:schemeClr>
+          </a:lnRef>
+          <a:fillRef idx="1">
+            <a:schemeClr val="accent1"/>
+          </a:fillRef>
+          <a:effectRef idx="0">
+            <a:schemeClr val="accent1"/>
+          </a:effectRef>
+          <a:fontRef idx="minor">
+            <a:schemeClr val="lt1"/>
+          </a:fontRef>
+        </p:style>
+        <p:txBody>
+          <a:bodyPr rtlCol="0" anchor="ctr"/>
+          <a:lstStyle/>
+          <a:p>
+            <a:pPr algn="ctr"/>
+            <a:endParaRPr lang="de-DE"/>
+          </a:p>
+        </p:txBody>
+      </p:sp>
+      <p:sp>
+        <p:nvSpPr>
+          <p:cNvPr id="11" name="AutoShape 2">
+            <a:extLst>
+              <a:ext uri="{FF2B5EF4-FFF2-40B4-BE49-F238E27FC236}">
+                <a16:creationId xmlns:a16="http://schemas.microsoft.com/office/drawing/2014/main" id="{5007D539-1923-4863-92C9-61F6FFADD89F}"/>
+              </a:ext>
+            </a:extLst>
+          </p:cNvPr>
+          <p:cNvSpPr/>
+          <p:nvPr/>
+        </p:nvSpPr>
+        <p:spPr>
+          <a:xfrm>
+            <a:off x="3579790" y="2871788"/>
+            <a:ext cx="1064419" cy="809367"/>
+          </a:xfrm>
+          <a:prstGeom prst="rect">
+            <a:avLst/>
+          </a:prstGeom>
+          <a:pattFill prst="pct5">
+            <a:fgClr>
+              <a:schemeClr val="accent1"/>
+            </a:fgClr>
+            <a:bgClr>
+              <a:schemeClr val="bg1"/>
+            </a:bgClr>
+          </a:pattFill>
+        </p:spPr>
+        <p:style>
+          <a:lnRef idx="2">
+            <a:schemeClr val="accent1">
+              <a:shade val="50000"/>
+            </a:schemeClr>
+          </a:lnRef>
+          <a:fillRef idx="1">
+            <a:schemeClr val="accent1"/>
+          </a:fillRef>
+          <a:effectRef idx="0">
+            <a:schemeClr val="accent1"/>
+          </a:effectRef>
+          <a:fontRef idx="minor">
+            <a:schemeClr val="lt1"/>
+          </a:fontRef>
+        </p:style>
+        <p:txBody>
+          <a:bodyPr rtlCol="0" anchor="ctr"/>
+          <a:lstStyle/>
+          <a:p>
+            <a:pPr algn="ctr"/>
+            <a:endParaRPr lang="de-DE" dirty="0"/>
           </a:p>
         </p:txBody>
       </p:sp>

</xml_diff>